<commit_message>
fixed typos and grammar changed some images
</commit_message>
<xml_diff>
--- a/assets/structure.pptx
+++ b/assets/structure.pptx
@@ -243,7 +243,7 @@
           <a:p>
             <a:fld id="{2AEDDAED-EE4E-4D76-BC67-2729C4DD90B8}" type="datetimeFigureOut">
               <a:rPr lang="de-DE" smtClean="0"/>
-              <a:t>13.03.2024</a:t>
+              <a:t>14.03.2024</a:t>
             </a:fld>
             <a:endParaRPr lang="de-DE"/>
           </a:p>
@@ -413,7 +413,7 @@
           <a:p>
             <a:fld id="{2AEDDAED-EE4E-4D76-BC67-2729C4DD90B8}" type="datetimeFigureOut">
               <a:rPr lang="de-DE" smtClean="0"/>
-              <a:t>13.03.2024</a:t>
+              <a:t>14.03.2024</a:t>
             </a:fld>
             <a:endParaRPr lang="de-DE"/>
           </a:p>
@@ -593,7 +593,7 @@
           <a:p>
             <a:fld id="{2AEDDAED-EE4E-4D76-BC67-2729C4DD90B8}" type="datetimeFigureOut">
               <a:rPr lang="de-DE" smtClean="0"/>
-              <a:t>13.03.2024</a:t>
+              <a:t>14.03.2024</a:t>
             </a:fld>
             <a:endParaRPr lang="de-DE"/>
           </a:p>
@@ -763,7 +763,7 @@
           <a:p>
             <a:fld id="{2AEDDAED-EE4E-4D76-BC67-2729C4DD90B8}" type="datetimeFigureOut">
               <a:rPr lang="de-DE" smtClean="0"/>
-              <a:t>13.03.2024</a:t>
+              <a:t>14.03.2024</a:t>
             </a:fld>
             <a:endParaRPr lang="de-DE"/>
           </a:p>
@@ -1007,7 +1007,7 @@
           <a:p>
             <a:fld id="{2AEDDAED-EE4E-4D76-BC67-2729C4DD90B8}" type="datetimeFigureOut">
               <a:rPr lang="de-DE" smtClean="0"/>
-              <a:t>13.03.2024</a:t>
+              <a:t>14.03.2024</a:t>
             </a:fld>
             <a:endParaRPr lang="de-DE"/>
           </a:p>
@@ -1239,7 +1239,7 @@
           <a:p>
             <a:fld id="{2AEDDAED-EE4E-4D76-BC67-2729C4DD90B8}" type="datetimeFigureOut">
               <a:rPr lang="de-DE" smtClean="0"/>
-              <a:t>13.03.2024</a:t>
+              <a:t>14.03.2024</a:t>
             </a:fld>
             <a:endParaRPr lang="de-DE"/>
           </a:p>
@@ -1606,7 +1606,7 @@
           <a:p>
             <a:fld id="{2AEDDAED-EE4E-4D76-BC67-2729C4DD90B8}" type="datetimeFigureOut">
               <a:rPr lang="de-DE" smtClean="0"/>
-              <a:t>13.03.2024</a:t>
+              <a:t>14.03.2024</a:t>
             </a:fld>
             <a:endParaRPr lang="de-DE"/>
           </a:p>
@@ -1724,7 +1724,7 @@
           <a:p>
             <a:fld id="{2AEDDAED-EE4E-4D76-BC67-2729C4DD90B8}" type="datetimeFigureOut">
               <a:rPr lang="de-DE" smtClean="0"/>
-              <a:t>13.03.2024</a:t>
+              <a:t>14.03.2024</a:t>
             </a:fld>
             <a:endParaRPr lang="de-DE"/>
           </a:p>
@@ -1819,7 +1819,7 @@
           <a:p>
             <a:fld id="{2AEDDAED-EE4E-4D76-BC67-2729C4DD90B8}" type="datetimeFigureOut">
               <a:rPr lang="de-DE" smtClean="0"/>
-              <a:t>13.03.2024</a:t>
+              <a:t>14.03.2024</a:t>
             </a:fld>
             <a:endParaRPr lang="de-DE"/>
           </a:p>
@@ -2096,7 +2096,7 @@
           <a:p>
             <a:fld id="{2AEDDAED-EE4E-4D76-BC67-2729C4DD90B8}" type="datetimeFigureOut">
               <a:rPr lang="de-DE" smtClean="0"/>
-              <a:t>13.03.2024</a:t>
+              <a:t>14.03.2024</a:t>
             </a:fld>
             <a:endParaRPr lang="de-DE"/>
           </a:p>
@@ -2353,7 +2353,7 @@
           <a:p>
             <a:fld id="{2AEDDAED-EE4E-4D76-BC67-2729C4DD90B8}" type="datetimeFigureOut">
               <a:rPr lang="de-DE" smtClean="0"/>
-              <a:t>13.03.2024</a:t>
+              <a:t>14.03.2024</a:t>
             </a:fld>
             <a:endParaRPr lang="de-DE"/>
           </a:p>
@@ -2566,7 +2566,7 @@
           <a:p>
             <a:fld id="{2AEDDAED-EE4E-4D76-BC67-2729C4DD90B8}" type="datetimeFigureOut">
               <a:rPr lang="de-DE" smtClean="0"/>
-              <a:t>13.03.2024</a:t>
+              <a:t>14.03.2024</a:t>
             </a:fld>
             <a:endParaRPr lang="de-DE"/>
           </a:p>
@@ -3198,42 +3198,6 @@
           </a:fontRef>
         </p:style>
       </p:cxnSp>
-      <p:pic>
-        <p:nvPicPr>
-          <p:cNvPr id="22" name="Grafik 21">
-            <a:extLst>
-              <a:ext uri="{FF2B5EF4-FFF2-40B4-BE49-F238E27FC236}">
-                <a16:creationId xmlns:a16="http://schemas.microsoft.com/office/drawing/2014/main" id="{BDADF684-861C-4DED-8BF1-3192FE81DEA7}"/>
-              </a:ext>
-            </a:extLst>
-          </p:cNvPr>
-          <p:cNvPicPr>
-            <a:picLocks noChangeAspect="1"/>
-          </p:cNvPicPr>
-          <p:nvPr/>
-        </p:nvPicPr>
-        <p:blipFill>
-          <a:blip r:embed="rId6">
-            <a:extLst>
-              <a:ext uri="{28A0092B-C50C-407E-A947-70E740481C1C}">
-                <a14:useLocalDpi xmlns:a14="http://schemas.microsoft.com/office/drawing/2010/main" val="0"/>
-              </a:ext>
-            </a:extLst>
-          </a:blip>
-          <a:stretch>
-            <a:fillRect/>
-          </a:stretch>
-        </p:blipFill>
-        <p:spPr>
-          <a:xfrm>
-            <a:off x="4104988" y="3484091"/>
-            <a:ext cx="1913371" cy="2530195"/>
-          </a:xfrm>
-          <a:prstGeom prst="rect">
-            <a:avLst/>
-          </a:prstGeom>
-        </p:spPr>
-      </p:pic>
       <p:cxnSp>
         <p:nvCxnSpPr>
           <p:cNvPr id="27" name="Gerade Verbindung mit Pfeil 26">
@@ -3332,7 +3296,7 @@
           <p:nvPr/>
         </p:nvPicPr>
         <p:blipFill>
-          <a:blip r:embed="rId7">
+          <a:blip r:embed="rId6">
             <a:extLst>
               <a:ext uri="{28A0092B-C50C-407E-A947-70E740481C1C}">
                 <a14:useLocalDpi xmlns:a14="http://schemas.microsoft.com/office/drawing/2010/main" val="0"/>
@@ -3347,42 +3311,6 @@
           <a:xfrm>
             <a:off x="6125461" y="690127"/>
             <a:ext cx="1913369" cy="2793964"/>
-          </a:xfrm>
-          <a:prstGeom prst="rect">
-            <a:avLst/>
-          </a:prstGeom>
-        </p:spPr>
-      </p:pic>
-      <p:pic>
-        <p:nvPicPr>
-          <p:cNvPr id="41" name="Grafik 40">
-            <a:extLst>
-              <a:ext uri="{FF2B5EF4-FFF2-40B4-BE49-F238E27FC236}">
-                <a16:creationId xmlns:a16="http://schemas.microsoft.com/office/drawing/2014/main" id="{B6EA1207-7D30-41EB-8235-A9356EDE0FB9}"/>
-              </a:ext>
-            </a:extLst>
-          </p:cNvPr>
-          <p:cNvPicPr>
-            <a:picLocks noChangeAspect="1"/>
-          </p:cNvPicPr>
-          <p:nvPr/>
-        </p:nvPicPr>
-        <p:blipFill>
-          <a:blip r:embed="rId8">
-            <a:extLst>
-              <a:ext uri="{28A0092B-C50C-407E-A947-70E740481C1C}">
-                <a14:useLocalDpi xmlns:a14="http://schemas.microsoft.com/office/drawing/2010/main" val="0"/>
-              </a:ext>
-            </a:extLst>
-          </a:blip>
-          <a:stretch>
-            <a:fillRect/>
-          </a:stretch>
-        </p:blipFill>
-        <p:spPr>
-          <a:xfrm>
-            <a:off x="6125461" y="3618094"/>
-            <a:ext cx="1913749" cy="2439371"/>
           </a:xfrm>
           <a:prstGeom prst="rect">
             <a:avLst/>
@@ -3430,12 +3358,48 @@
           </a:fontRef>
         </p:style>
       </p:cxnSp>
+      <p:pic>
+        <p:nvPicPr>
+          <p:cNvPr id="3" name="Grafik 2">
+            <a:extLst>
+              <a:ext uri="{FF2B5EF4-FFF2-40B4-BE49-F238E27FC236}">
+                <a16:creationId xmlns:a16="http://schemas.microsoft.com/office/drawing/2014/main" id="{A7A2D711-CF7D-4D42-BA7C-FD5004EBFF87}"/>
+              </a:ext>
+            </a:extLst>
+          </p:cNvPr>
+          <p:cNvPicPr>
+            <a:picLocks noChangeAspect="1"/>
+          </p:cNvPicPr>
+          <p:nvPr/>
+        </p:nvPicPr>
+        <p:blipFill>
+          <a:blip r:embed="rId7">
+            <a:extLst>
+              <a:ext uri="{28A0092B-C50C-407E-A947-70E740481C1C}">
+                <a14:useLocalDpi xmlns:a14="http://schemas.microsoft.com/office/drawing/2010/main" val="0"/>
+              </a:ext>
+            </a:extLst>
+          </a:blip>
+          <a:stretch>
+            <a:fillRect/>
+          </a:stretch>
+        </p:blipFill>
+        <p:spPr>
+          <a:xfrm>
+            <a:off x="4107991" y="3429000"/>
+            <a:ext cx="1907363" cy="2467638"/>
+          </a:xfrm>
+          <a:prstGeom prst="rect">
+            <a:avLst/>
+          </a:prstGeom>
+        </p:spPr>
+      </p:pic>
       <p:cxnSp>
         <p:nvCxnSpPr>
-          <p:cNvPr id="47" name="Gerade Verbindung mit Pfeil 46">
+          <p:cNvPr id="18" name="Gerade Verbindung mit Pfeil 17">
             <a:extLst>
               <a:ext uri="{FF2B5EF4-FFF2-40B4-BE49-F238E27FC236}">
-                <a16:creationId xmlns:a16="http://schemas.microsoft.com/office/drawing/2014/main" id="{D467D5C2-A73F-4DF0-AD04-A3D09640E4DF}"/>
+                <a16:creationId xmlns:a16="http://schemas.microsoft.com/office/drawing/2014/main" id="{D1C8CFCC-71F8-4547-B2E4-768FF546EA00}"/>
               </a:ext>
             </a:extLst>
           </p:cNvPr>
@@ -3446,7 +3410,7 @@
         </p:nvCxnSpPr>
         <p:spPr>
           <a:xfrm>
-            <a:off x="5629013" y="3681413"/>
+            <a:off x="5629012" y="3603900"/>
             <a:ext cx="496447" cy="58669"/>
           </a:xfrm>
           <a:prstGeom prst="straightConnector1">
@@ -3471,6 +3435,42 @@
           </a:fontRef>
         </p:style>
       </p:cxnSp>
+      <p:pic>
+        <p:nvPicPr>
+          <p:cNvPr id="5" name="Grafik 4">
+            <a:extLst>
+              <a:ext uri="{FF2B5EF4-FFF2-40B4-BE49-F238E27FC236}">
+                <a16:creationId xmlns:a16="http://schemas.microsoft.com/office/drawing/2014/main" id="{6DB0D3AC-170E-4FD6-A17E-1C3FA459BD64}"/>
+              </a:ext>
+            </a:extLst>
+          </p:cNvPr>
+          <p:cNvPicPr>
+            <a:picLocks noChangeAspect="1"/>
+          </p:cNvPicPr>
+          <p:nvPr/>
+        </p:nvPicPr>
+        <p:blipFill>
+          <a:blip r:embed="rId8">
+            <a:extLst>
+              <a:ext uri="{28A0092B-C50C-407E-A947-70E740481C1C}">
+                <a14:useLocalDpi xmlns:a14="http://schemas.microsoft.com/office/drawing/2010/main" val="0"/>
+              </a:ext>
+            </a:extLst>
+          </a:blip>
+          <a:stretch>
+            <a:fillRect/>
+          </a:stretch>
+        </p:blipFill>
+        <p:spPr>
+          <a:xfrm>
+            <a:off x="6131467" y="3547705"/>
+            <a:ext cx="1907363" cy="2386732"/>
+          </a:xfrm>
+          <a:prstGeom prst="rect">
+            <a:avLst/>
+          </a:prstGeom>
+        </p:spPr>
+      </p:pic>
     </p:spTree>
     <p:extLst>
       <p:ext uri="{BB962C8B-B14F-4D97-AF65-F5344CB8AC3E}">

</xml_diff>